<commit_message>
Added BackCommand to interface
</commit_message>
<xml_diff>
--- a/Slides/Lecture10 - Security and stuff.pptx
+++ b/Slides/Lecture10 - Security and stuff.pptx
@@ -5,18 +5,22 @@
     <p:sldMasterId id="2147484082" r:id="rId4"/>
   </p:sldMasterIdLst>
   <p:notesMasterIdLst>
-    <p:notesMasterId r:id="rId11"/>
+    <p:notesMasterId r:id="rId15"/>
   </p:notesMasterIdLst>
   <p:handoutMasterIdLst>
-    <p:handoutMasterId r:id="rId12"/>
+    <p:handoutMasterId r:id="rId16"/>
   </p:handoutMasterIdLst>
   <p:sldIdLst>
     <p:sldId id="897" r:id="rId5"/>
     <p:sldId id="927" r:id="rId6"/>
     <p:sldId id="938" r:id="rId7"/>
-    <p:sldId id="937" r:id="rId8"/>
-    <p:sldId id="928" r:id="rId9"/>
-    <p:sldId id="929" r:id="rId10"/>
+    <p:sldId id="942" r:id="rId8"/>
+    <p:sldId id="937" r:id="rId9"/>
+    <p:sldId id="939" r:id="rId10"/>
+    <p:sldId id="940" r:id="rId11"/>
+    <p:sldId id="941" r:id="rId12"/>
+    <p:sldId id="928" r:id="rId13"/>
+    <p:sldId id="929" r:id="rId14"/>
   </p:sldIdLst>
   <p:sldSz cx="9326563" cy="6994525"/>
   <p:notesSz cx="6858000" cy="9144000"/>
@@ -123,7 +127,11 @@
             <p14:sldId id="897"/>
             <p14:sldId id="927"/>
             <p14:sldId id="938"/>
+            <p14:sldId id="942"/>
             <p14:sldId id="937"/>
+            <p14:sldId id="939"/>
+            <p14:sldId id="940"/>
+            <p14:sldId id="941"/>
             <p14:sldId id="928"/>
             <p14:sldId id="929"/>
           </p14:sldIdLst>
@@ -340,7 +348,7 @@
               <a:rPr lang="en-US" smtClean="0">
                 <a:latin typeface="Segoe UI" pitchFamily="34" charset="0"/>
               </a:rPr>
-              <a:t>11/6/2018</a:t>
+              <a:t>11/9/2018</a:t>
             </a:fld>
             <a:endParaRPr lang="en-US" dirty="0">
               <a:latin typeface="Segoe UI" pitchFamily="34" charset="0"/>
@@ -663,7 +671,7 @@
             <a:fld id="{D51B1278-D92B-4AF3-A9C1-71DD298190CE}" type="datetimeFigureOut">
               <a:rPr lang="en-US" smtClean="0"/>
               <a:pPr/>
-              <a:t>11/6/2018</a:t>
+              <a:t>11/9/2018</a:t>
             </a:fld>
             <a:endParaRPr lang="en-US" dirty="0"/>
           </a:p>
@@ -1068,7 +1076,7 @@
           <a:p>
             <a:fld id="{23C664AC-E9A8-46F0-BB26-995D9E922CBA}" type="datetime1">
               <a:rPr lang="en-US" smtClean="0"/>
-              <a:t>11/6/2018</a:t>
+              <a:t>11/9/2018</a:t>
             </a:fld>
             <a:endParaRPr lang="en-US" dirty="0"/>
           </a:p>
@@ -1271,7 +1279,7 @@
           <a:p>
             <a:fld id="{C4F94B10-4342-40FC-AEC6-5C03AF201BA2}" type="datetime1">
               <a:rPr lang="en-US" smtClean="0"/>
-              <a:t>11/6/2018</a:t>
+              <a:t>11/9/2018</a:t>
             </a:fld>
             <a:endParaRPr lang="en-US" dirty="0"/>
           </a:p>
@@ -1474,7 +1482,7 @@
           <a:p>
             <a:fld id="{53596968-992A-414E-8ED3-8C05A9EDAB51}" type="datetime1">
               <a:rPr lang="en-US" smtClean="0"/>
-              <a:t>11/6/2018</a:t>
+              <a:t>11/9/2018</a:t>
             </a:fld>
             <a:endParaRPr lang="en-US" dirty="0"/>
           </a:p>
@@ -1498,7 +1506,7 @@
             <a:fld id="{B4008EB6-D09E-4580-8CD6-DDB14511944F}" type="slidenum">
               <a:rPr lang="en-US" smtClean="0"/>
               <a:pPr/>
-              <a:t>4</a:t>
+              <a:t>5</a:t>
             </a:fld>
             <a:endParaRPr lang="en-US" dirty="0"/>
           </a:p>
@@ -1677,7 +1685,7 @@
           <a:p>
             <a:fld id="{CFA64FBE-D613-4251-8C47-A46D32E2625C}" type="datetime1">
               <a:rPr lang="en-US" smtClean="0"/>
-              <a:t>11/6/2018</a:t>
+              <a:t>11/9/2018</a:t>
             </a:fld>
             <a:endParaRPr lang="en-US" dirty="0"/>
           </a:p>
@@ -1701,7 +1709,7 @@
             <a:fld id="{B4008EB6-D09E-4580-8CD6-DDB14511944F}" type="slidenum">
               <a:rPr lang="en-US" smtClean="0"/>
               <a:pPr/>
-              <a:t>5</a:t>
+              <a:t>9</a:t>
             </a:fld>
             <a:endParaRPr lang="en-US" dirty="0"/>
           </a:p>
@@ -1880,7 +1888,7 @@
           <a:p>
             <a:fld id="{664D81C8-F2DB-4680-BACD-87EC6828ADB5}" type="datetime1">
               <a:rPr lang="en-US" smtClean="0"/>
-              <a:t>11/6/2018</a:t>
+              <a:t>11/9/2018</a:t>
             </a:fld>
             <a:endParaRPr lang="en-US" dirty="0"/>
           </a:p>
@@ -1904,7 +1912,7 @@
             <a:fld id="{B4008EB6-D09E-4580-8CD6-DDB14511944F}" type="slidenum">
               <a:rPr lang="en-US" smtClean="0"/>
               <a:pPr/>
-              <a:t>6</a:t>
+              <a:t>10</a:t>
             </a:fld>
             <a:endParaRPr lang="en-US" dirty="0"/>
           </a:p>
@@ -5629,6 +5637,179 @@
 </p:sld>
 </file>
 
+<file path=ppt/slides/slide10.xml><?xml version="1.0" encoding="utf-8"?>
+<p:sld xmlns:a="http://schemas.openxmlformats.org/drawingml/2006/main" xmlns:r="http://schemas.openxmlformats.org/officeDocument/2006/relationships" xmlns:p="http://schemas.openxmlformats.org/presentationml/2006/main">
+  <p:cSld>
+    <p:bg>
+      <p:bgPr>
+        <a:solidFill>
+          <a:srgbClr val="7030A0"/>
+        </a:solidFill>
+        <a:effectLst/>
+      </p:bgPr>
+    </p:bg>
+    <p:spTree>
+      <p:nvGrpSpPr>
+        <p:cNvPr id="1" name=""/>
+        <p:cNvGrpSpPr/>
+        <p:nvPr/>
+      </p:nvGrpSpPr>
+      <p:grpSpPr>
+        <a:xfrm>
+          <a:off x="0" y="0"/>
+          <a:ext cx="0" cy="0"/>
+          <a:chOff x="0" y="0"/>
+          <a:chExt cx="0" cy="0"/>
+        </a:xfrm>
+      </p:grpSpPr>
+      <p:sp>
+        <p:nvSpPr>
+          <p:cNvPr id="2" name="Title 1"/>
+          <p:cNvSpPr>
+            <a:spLocks noGrp="1"/>
+          </p:cNvSpPr>
+          <p:nvPr>
+            <p:ph type="title"/>
+          </p:nvPr>
+        </p:nvSpPr>
+        <p:spPr/>
+        <p:txBody>
+          <a:bodyPr/>
+          <a:lstStyle/>
+          <a:p>
+            <a:r>
+              <a:rPr lang="da-DK" dirty="0">
+                <a:solidFill>
+                  <a:schemeClr val="bg1"/>
+                </a:solidFill>
+              </a:rPr>
+              <a:t>Final Lecture II – proposed topics</a:t>
+            </a:r>
+          </a:p>
+        </p:txBody>
+      </p:sp>
+      <p:sp>
+        <p:nvSpPr>
+          <p:cNvPr id="3" name="Text Placeholder 2"/>
+          <p:cNvSpPr>
+            <a:spLocks noGrp="1"/>
+          </p:cNvSpPr>
+          <p:nvPr>
+            <p:ph type="body" sz="quarter" idx="10"/>
+          </p:nvPr>
+        </p:nvSpPr>
+        <p:spPr>
+          <a:xfrm>
+            <a:off x="274209" y="1212850"/>
+            <a:ext cx="8778240" cy="5447645"/>
+          </a:xfrm>
+        </p:spPr>
+        <p:txBody>
+          <a:bodyPr/>
+          <a:lstStyle/>
+          <a:p>
+            <a:r>
+              <a:rPr lang="da-DK" dirty="0">
+                <a:solidFill>
+                  <a:schemeClr val="bg1"/>
+                </a:solidFill>
+              </a:rPr>
+              <a:t>Publishing apps to the cloud</a:t>
+            </a:r>
+          </a:p>
+          <a:p>
+            <a:endParaRPr lang="da-DK" dirty="0">
+              <a:solidFill>
+                <a:schemeClr val="bg1"/>
+              </a:solidFill>
+            </a:endParaRPr>
+          </a:p>
+          <a:p>
+            <a:r>
+              <a:rPr lang="da-DK" dirty="0">
+                <a:solidFill>
+                  <a:schemeClr val="bg1"/>
+                </a:solidFill>
+              </a:rPr>
+              <a:t>Github + Azure Pipelines</a:t>
+            </a:r>
+          </a:p>
+          <a:p>
+            <a:endParaRPr lang="da-DK" dirty="0">
+              <a:solidFill>
+                <a:schemeClr val="bg1"/>
+              </a:solidFill>
+            </a:endParaRPr>
+          </a:p>
+          <a:p>
+            <a:r>
+              <a:rPr lang="da-DK" dirty="0">
+                <a:solidFill>
+                  <a:schemeClr val="bg1"/>
+                </a:solidFill>
+              </a:rPr>
+              <a:t>Concurrency in Entity Framework Core</a:t>
+            </a:r>
+          </a:p>
+          <a:p>
+            <a:endParaRPr lang="da-DK" dirty="0">
+              <a:solidFill>
+                <a:schemeClr val="bg1"/>
+              </a:solidFill>
+            </a:endParaRPr>
+          </a:p>
+          <a:p>
+            <a:r>
+              <a:rPr lang="da-DK" dirty="0">
+                <a:solidFill>
+                  <a:schemeClr val="bg1"/>
+                </a:solidFill>
+              </a:rPr>
+              <a:t>Development with external (cloud?) database</a:t>
+            </a:r>
+          </a:p>
+          <a:p>
+            <a:r>
+              <a:rPr lang="da-DK" dirty="0">
+                <a:solidFill>
+                  <a:schemeClr val="bg1"/>
+                </a:solidFill>
+              </a:rPr>
+              <a:t>Integration testing app</a:t>
+            </a:r>
+            <a:r>
+              <a:rPr lang="da-DK" dirty="0">
+                <a:solidFill>
+                  <a:schemeClr val="bg1"/>
+                </a:solidFill>
+                <a:sym typeface="Wingdings" panose="05000000000000000000" pitchFamily="2" charset="2"/>
+              </a:rPr>
+              <a:t>api</a:t>
+            </a:r>
+            <a:endParaRPr lang="da-DK" dirty="0">
+              <a:solidFill>
+                <a:schemeClr val="bg1"/>
+              </a:solidFill>
+            </a:endParaRPr>
+          </a:p>
+        </p:txBody>
+      </p:sp>
+    </p:spTree>
+    <p:extLst>
+      <p:ext uri="{BB962C8B-B14F-4D97-AF65-F5344CB8AC3E}">
+        <p14:creationId xmlns:p14="http://schemas.microsoft.com/office/powerpoint/2010/main" val="3512292764"/>
+      </p:ext>
+    </p:extLst>
+  </p:cSld>
+  <p:clrMapOvr>
+    <a:masterClrMapping/>
+  </p:clrMapOvr>
+  <p:transition>
+    <p:fade/>
+  </p:transition>
+</p:sld>
+</file>
+
 <file path=ppt/slides/slide2.xml><?xml version="1.0" encoding="utf-8"?>
 <p:sld xmlns:a="http://schemas.openxmlformats.org/drawingml/2006/main" xmlns:r="http://schemas.openxmlformats.org/officeDocument/2006/relationships" xmlns:p="http://schemas.openxmlformats.org/presentationml/2006/main">
   <p:cSld>
@@ -5693,7 +5874,7 @@
         <p:spPr>
           <a:xfrm>
             <a:off x="274209" y="1212850"/>
-            <a:ext cx="8778240" cy="3877985"/>
+            <a:ext cx="8778240" cy="4961358"/>
           </a:xfrm>
         </p:spPr>
         <p:txBody>
@@ -5723,7 +5904,24 @@
                   <a:schemeClr val="bg1"/>
                 </a:solidFill>
               </a:rPr>
-              <a:t>Security in ASP.NET, UWP, and Xamarin.Forms</a:t>
+              <a:t>Security in ASP.NET Core Web API</a:t>
+            </a:r>
+          </a:p>
+          <a:p>
+            <a:endParaRPr lang="da-DK" sz="3200" dirty="0">
+              <a:solidFill>
+                <a:schemeClr val="bg1"/>
+              </a:solidFill>
+            </a:endParaRPr>
+          </a:p>
+          <a:p>
+            <a:r>
+              <a:rPr lang="da-DK" sz="3200" dirty="0">
+                <a:solidFill>
+                  <a:schemeClr val="bg1"/>
+                </a:solidFill>
+              </a:rPr>
+              <a:t>Security in UWP and Xamarin.Forms</a:t>
             </a:r>
           </a:p>
           <a:p>
@@ -5919,6 +6117,212 @@
     <p:bg>
       <p:bgPr>
         <a:solidFill>
+          <a:srgbClr val="0072C6"/>
+        </a:solidFill>
+        <a:effectLst/>
+      </p:bgPr>
+    </p:bg>
+    <p:spTree>
+      <p:nvGrpSpPr>
+        <p:cNvPr id="1" name=""/>
+        <p:cNvGrpSpPr/>
+        <p:nvPr/>
+      </p:nvGrpSpPr>
+      <p:grpSpPr>
+        <a:xfrm>
+          <a:off x="0" y="0"/>
+          <a:ext cx="0" cy="0"/>
+          <a:chOff x="0" y="0"/>
+          <a:chExt cx="0" cy="0"/>
+        </a:xfrm>
+      </p:grpSpPr>
+      <p:sp>
+        <p:nvSpPr>
+          <p:cNvPr id="2" name="Title 1">
+            <a:extLst>
+              <a:ext uri="{FF2B5EF4-FFF2-40B4-BE49-F238E27FC236}">
+                <a16:creationId xmlns:a16="http://schemas.microsoft.com/office/drawing/2014/main" id="{C3475826-2DF5-4379-9E45-2641C01156BB}"/>
+              </a:ext>
+            </a:extLst>
+          </p:cNvPr>
+          <p:cNvSpPr>
+            <a:spLocks noGrp="1"/>
+          </p:cNvSpPr>
+          <p:nvPr>
+            <p:ph type="title"/>
+          </p:nvPr>
+        </p:nvSpPr>
+        <p:spPr/>
+        <p:txBody>
+          <a:bodyPr/>
+          <a:lstStyle/>
+          <a:p>
+            <a:r>
+              <a:rPr lang="da-DK" dirty="0">
+                <a:solidFill>
+                  <a:schemeClr val="bg1"/>
+                </a:solidFill>
+              </a:rPr>
+              <a:t>Security in .NET</a:t>
+            </a:r>
+            <a:endParaRPr lang="en-DK" dirty="0">
+              <a:solidFill>
+                <a:schemeClr val="bg1"/>
+              </a:solidFill>
+            </a:endParaRPr>
+          </a:p>
+        </p:txBody>
+      </p:sp>
+      <p:sp>
+        <p:nvSpPr>
+          <p:cNvPr id="3" name="Text Placeholder 2">
+            <a:extLst>
+              <a:ext uri="{FF2B5EF4-FFF2-40B4-BE49-F238E27FC236}">
+                <a16:creationId xmlns:a16="http://schemas.microsoft.com/office/drawing/2014/main" id="{4519666B-89EA-4F46-A795-891AC33A19A0}"/>
+              </a:ext>
+            </a:extLst>
+          </p:cNvPr>
+          <p:cNvSpPr>
+            <a:spLocks noGrp="1"/>
+          </p:cNvSpPr>
+          <p:nvPr>
+            <p:ph type="body" sz="quarter" idx="10"/>
+          </p:nvPr>
+        </p:nvSpPr>
+        <p:spPr>
+          <a:xfrm>
+            <a:off x="274209" y="1212850"/>
+            <a:ext cx="8778240" cy="4949047"/>
+          </a:xfrm>
+        </p:spPr>
+        <p:txBody>
+          <a:bodyPr/>
+          <a:lstStyle/>
+          <a:p>
+            <a:r>
+              <a:rPr lang="da-DK" dirty="0">
+                <a:solidFill>
+                  <a:schemeClr val="bg1"/>
+                </a:solidFill>
+              </a:rPr>
+              <a:t>Out-of-the-box:</a:t>
+            </a:r>
+          </a:p>
+          <a:p>
+            <a:pPr marL="571500" indent="-571500">
+              <a:buFont typeface="Arial" panose="020B0604020202020204" pitchFamily="34" charset="0"/>
+              <a:buChar char="•"/>
+            </a:pPr>
+            <a:r>
+              <a:rPr lang="da-DK" dirty="0">
+                <a:solidFill>
+                  <a:schemeClr val="bg1"/>
+                </a:solidFill>
+              </a:rPr>
+              <a:t>No Authentication</a:t>
+            </a:r>
+          </a:p>
+          <a:p>
+            <a:pPr marL="571500" indent="-571500">
+              <a:buFont typeface="Arial" panose="020B0604020202020204" pitchFamily="34" charset="0"/>
+              <a:buChar char="•"/>
+            </a:pPr>
+            <a:r>
+              <a:rPr lang="da-DK" dirty="0">
+                <a:solidFill>
+                  <a:schemeClr val="bg1"/>
+                </a:solidFill>
+              </a:rPr>
+              <a:t>Invidual User Accounts</a:t>
+            </a:r>
+          </a:p>
+          <a:p>
+            <a:pPr marL="571500" indent="-571500">
+              <a:buFont typeface="Arial" panose="020B0604020202020204" pitchFamily="34" charset="0"/>
+              <a:buChar char="•"/>
+            </a:pPr>
+            <a:r>
+              <a:rPr lang="da-DK" dirty="0">
+                <a:solidFill>
+                  <a:schemeClr val="bg1"/>
+                </a:solidFill>
+              </a:rPr>
+              <a:t>Work or School Accounts (AAD)</a:t>
+            </a:r>
+          </a:p>
+          <a:p>
+            <a:pPr marL="571500" indent="-571500">
+              <a:buFont typeface="Arial" panose="020B0604020202020204" pitchFamily="34" charset="0"/>
+              <a:buChar char="•"/>
+            </a:pPr>
+            <a:r>
+              <a:rPr lang="da-DK" dirty="0">
+                <a:solidFill>
+                  <a:schemeClr val="bg1"/>
+                </a:solidFill>
+              </a:rPr>
+              <a:t>Windows Authentication (AD)</a:t>
+            </a:r>
+          </a:p>
+          <a:p>
+            <a:pPr marL="571500" indent="-571500">
+              <a:buFont typeface="Arial" panose="020B0604020202020204" pitchFamily="34" charset="0"/>
+              <a:buChar char="•"/>
+            </a:pPr>
+            <a:endParaRPr lang="da-DK" dirty="0">
+              <a:solidFill>
+                <a:schemeClr val="bg1"/>
+              </a:solidFill>
+            </a:endParaRPr>
+          </a:p>
+          <a:p>
+            <a:r>
+              <a:rPr lang="da-DK" dirty="0">
+                <a:solidFill>
+                  <a:schemeClr val="bg1"/>
+                </a:solidFill>
+              </a:rPr>
+              <a:t>New:</a:t>
+            </a:r>
+          </a:p>
+          <a:p>
+            <a:pPr marL="571500" indent="-571500">
+              <a:buFont typeface="Arial" panose="020B0604020202020204" pitchFamily="34" charset="0"/>
+              <a:buChar char="•"/>
+            </a:pPr>
+            <a:r>
+              <a:rPr lang="da-DK" dirty="0">
+                <a:solidFill>
+                  <a:schemeClr val="bg1"/>
+                </a:solidFill>
+              </a:rPr>
+              <a:t>Azure Active Directory B2C</a:t>
+            </a:r>
+          </a:p>
+        </p:txBody>
+      </p:sp>
+    </p:spTree>
+    <p:extLst>
+      <p:ext uri="{BB962C8B-B14F-4D97-AF65-F5344CB8AC3E}">
+        <p14:creationId xmlns:p14="http://schemas.microsoft.com/office/powerpoint/2010/main" val="993449250"/>
+      </p:ext>
+    </p:extLst>
+  </p:cSld>
+  <p:clrMapOvr>
+    <a:masterClrMapping/>
+  </p:clrMapOvr>
+  <p:transition>
+    <p:fade/>
+  </p:transition>
+</p:sld>
+</file>
+
+<file path=ppt/slides/slide5.xml><?xml version="1.0" encoding="utf-8"?>
+<p:sld xmlns:a="http://schemas.openxmlformats.org/drawingml/2006/main" xmlns:r="http://schemas.openxmlformats.org/officeDocument/2006/relationships" xmlns:p="http://schemas.openxmlformats.org/presentationml/2006/main">
+  <p:cSld>
+    <p:bg>
+      <p:bgPr>
+        <a:solidFill>
           <a:srgbClr val="505050"/>
         </a:solidFill>
         <a:effectLst/>
@@ -5989,7 +6393,7 @@
         <p:spPr>
           <a:xfrm>
             <a:off x="274209" y="1212850"/>
-            <a:ext cx="8778240" cy="4339650"/>
+            <a:ext cx="8778240" cy="4838248"/>
           </a:xfrm>
         </p:spPr>
         <p:txBody>
@@ -6072,7 +6476,7 @@
                   <a:schemeClr val="bg1"/>
                 </a:solidFill>
               </a:rPr>
-              <a:t>Enable SSL</a:t>
+              <a:t>Enable SSL (if you forgot to do so in the first place…)</a:t>
             </a:r>
           </a:p>
         </p:txBody>
@@ -6093,13 +6497,13 @@
 </p:sld>
 </file>
 
-<file path=ppt/slides/slide5.xml><?xml version="1.0" encoding="utf-8"?>
+<file path=ppt/slides/slide6.xml><?xml version="1.0" encoding="utf-8"?>
 <p:sld xmlns:a="http://schemas.openxmlformats.org/drawingml/2006/main" xmlns:r="http://schemas.openxmlformats.org/officeDocument/2006/relationships" xmlns:p="http://schemas.openxmlformats.org/presentationml/2006/main">
   <p:cSld>
     <p:bg>
       <p:bgPr>
         <a:solidFill>
-          <a:srgbClr val="BA141A"/>
+          <a:srgbClr val="00B050"/>
         </a:solidFill>
         <a:effectLst/>
       </p:bgPr>
@@ -6120,7 +6524,13 @@
       </p:grpSpPr>
       <p:sp>
         <p:nvSpPr>
-          <p:cNvPr id="2" name="Title 1"/>
+          <p:cNvPr id="2" name="Title 1">
+            <a:extLst>
+              <a:ext uri="{FF2B5EF4-FFF2-40B4-BE49-F238E27FC236}">
+                <a16:creationId xmlns:a16="http://schemas.microsoft.com/office/drawing/2014/main" id="{7B44441B-DD82-4396-8C2A-F48CE641DE04}"/>
+              </a:ext>
+            </a:extLst>
+          </p:cNvPr>
           <p:cNvSpPr>
             <a:spLocks noGrp="1"/>
           </p:cNvSpPr>
@@ -6139,23 +6549,25 @@
                   <a:schemeClr val="bg1"/>
                 </a:solidFill>
               </a:rPr>
-              <a:t>Final </a:t>
-            </a:r>
-            <a:r>
-              <a:rPr lang="da-DK" dirty="0" err="1">
-                <a:solidFill>
-                  <a:schemeClr val="bg1"/>
-                </a:solidFill>
-              </a:rPr>
-              <a:t>Lecture</a:t>
-            </a:r>
-            <a:endParaRPr lang="da-DK" dirty="0"/>
-          </a:p>
-        </p:txBody>
-      </p:sp>
-      <p:sp>
-        <p:nvSpPr>
-          <p:cNvPr id="3" name="Text Placeholder 2"/>
+              <a:t>Security in UWP / Xamarin.Forms</a:t>
+            </a:r>
+            <a:endParaRPr lang="en-DK" dirty="0">
+              <a:solidFill>
+                <a:schemeClr val="bg1"/>
+              </a:solidFill>
+            </a:endParaRPr>
+          </a:p>
+        </p:txBody>
+      </p:sp>
+      <p:sp>
+        <p:nvSpPr>
+          <p:cNvPr id="3" name="Text Placeholder 2">
+            <a:extLst>
+              <a:ext uri="{FF2B5EF4-FFF2-40B4-BE49-F238E27FC236}">
+                <a16:creationId xmlns:a16="http://schemas.microsoft.com/office/drawing/2014/main" id="{20194AD5-2D74-4DAA-812F-2EE4BD3D2DDD}"/>
+              </a:ext>
+            </a:extLst>
+          </p:cNvPr>
           <p:cNvSpPr>
             <a:spLocks noGrp="1"/>
           </p:cNvSpPr>
@@ -6166,69 +6578,25 @@
         <p:spPr>
           <a:xfrm>
             <a:off x="274209" y="1212850"/>
-            <a:ext cx="8778240" cy="1902059"/>
+            <a:ext cx="8778240" cy="3010055"/>
           </a:xfrm>
         </p:spPr>
         <p:txBody>
           <a:bodyPr/>
           <a:lstStyle/>
           <a:p>
+            <a:pPr marL="571500" indent="-571500">
+              <a:buFont typeface="Symbol" panose="05050102010706020507" pitchFamily="18" charset="2"/>
+              <a:buChar char="Þ"/>
+            </a:pPr>
             <a:r>
               <a:rPr lang="da-DK" dirty="0">
                 <a:solidFill>
                   <a:schemeClr val="bg1"/>
                 </a:solidFill>
+                <a:hlinkClick r:id="rId2"/>
               </a:rPr>
-              <a:t>23 November 2017</a:t>
-            </a:r>
-          </a:p>
-          <a:p>
-            <a:endParaRPr lang="da-DK" dirty="0">
-              <a:solidFill>
-                <a:schemeClr val="bg1"/>
-              </a:solidFill>
-            </a:endParaRPr>
-          </a:p>
-          <a:p>
-            <a:r>
-              <a:rPr lang="da-DK" dirty="0" err="1">
-                <a:solidFill>
-                  <a:schemeClr val="bg1"/>
-                </a:solidFill>
-              </a:rPr>
-              <a:t>Recap</a:t>
-            </a:r>
-            <a:r>
-              <a:rPr lang="da-DK" dirty="0">
-                <a:solidFill>
-                  <a:schemeClr val="bg1"/>
-                </a:solidFill>
-              </a:rPr>
-              <a:t> / repetition – </a:t>
-            </a:r>
-            <a:r>
-              <a:rPr lang="da-DK" dirty="0" err="1">
-                <a:solidFill>
-                  <a:schemeClr val="bg1"/>
-                </a:solidFill>
-              </a:rPr>
-              <a:t>what</a:t>
-            </a:r>
-            <a:r>
-              <a:rPr lang="da-DK" dirty="0">
-                <a:solidFill>
-                  <a:schemeClr val="bg1"/>
-                </a:solidFill>
-              </a:rPr>
-              <a:t> do </a:t>
-            </a:r>
-            <a:r>
-              <a:rPr lang="da-DK" dirty="0" err="1">
-                <a:solidFill>
-                  <a:schemeClr val="bg1"/>
-                </a:solidFill>
-              </a:rPr>
-              <a:t>you</a:t>
+              <a:t>https://portal.azure.com/</a:t>
             </a:r>
             <a:r>
               <a:rPr lang="da-DK" dirty="0">
@@ -6238,29 +6606,69 @@
               </a:rPr>
               <a:t> </a:t>
             </a:r>
-            <a:r>
-              <a:rPr lang="da-DK" dirty="0" err="1">
-                <a:solidFill>
-                  <a:schemeClr val="bg1"/>
-                </a:solidFill>
-              </a:rPr>
-              <a:t>need</a:t>
-            </a:r>
+          </a:p>
+          <a:p>
+            <a:pPr marL="571500" indent="-571500">
+              <a:buFont typeface="Symbol" panose="05050102010706020507" pitchFamily="18" charset="2"/>
+              <a:buChar char="Þ"/>
+            </a:pPr>
             <a:r>
               <a:rPr lang="da-DK" dirty="0">
                 <a:solidFill>
                   <a:schemeClr val="bg1"/>
                 </a:solidFill>
               </a:rPr>
-              <a:t>?</a:t>
-            </a:r>
+              <a:t>Azure Active Directory</a:t>
+            </a:r>
+          </a:p>
+          <a:p>
+            <a:pPr marL="571500" indent="-571500">
+              <a:buFont typeface="Symbol" panose="05050102010706020507" pitchFamily="18" charset="2"/>
+              <a:buChar char="Þ"/>
+            </a:pPr>
+            <a:r>
+              <a:rPr lang="da-DK" dirty="0">
+                <a:solidFill>
+                  <a:schemeClr val="bg1"/>
+                </a:solidFill>
+              </a:rPr>
+              <a:t>App registrations (Preview)</a:t>
+            </a:r>
+          </a:p>
+          <a:p>
+            <a:pPr marL="571500" indent="-571500">
+              <a:buFont typeface="Symbol" panose="05050102010706020507" pitchFamily="18" charset="2"/>
+              <a:buChar char="Þ"/>
+            </a:pPr>
+            <a:r>
+              <a:rPr lang="da-DK" dirty="0">
+                <a:solidFill>
+                  <a:schemeClr val="bg1"/>
+                </a:solidFill>
+                <a:hlinkClick r:id="rId3"/>
+              </a:rPr>
+              <a:t>https://azure.microsoft.com/en-us/resources/samples</a:t>
+            </a:r>
+            <a:r>
+              <a:rPr lang="da-DK" dirty="0">
+                <a:solidFill>
+                  <a:schemeClr val="bg1"/>
+                </a:solidFill>
+              </a:rPr>
+              <a:t> </a:t>
+            </a:r>
+            <a:endParaRPr lang="en-DK" dirty="0">
+              <a:solidFill>
+                <a:schemeClr val="bg1"/>
+              </a:solidFill>
+            </a:endParaRPr>
           </a:p>
         </p:txBody>
       </p:sp>
     </p:spTree>
     <p:extLst>
       <p:ext uri="{BB962C8B-B14F-4D97-AF65-F5344CB8AC3E}">
-        <p14:creationId xmlns:p14="http://schemas.microsoft.com/office/powerpoint/2010/main" val="3493958456"/>
+        <p14:creationId xmlns:p14="http://schemas.microsoft.com/office/powerpoint/2010/main" val="3585927119"/>
       </p:ext>
     </p:extLst>
   </p:cSld>
@@ -6273,13 +6681,13 @@
 </p:sld>
 </file>
 
-<file path=ppt/slides/slide6.xml><?xml version="1.0" encoding="utf-8"?>
+<file path=ppt/slides/slide7.xml><?xml version="1.0" encoding="utf-8"?>
 <p:sld xmlns:a="http://schemas.openxmlformats.org/drawingml/2006/main" xmlns:r="http://schemas.openxmlformats.org/officeDocument/2006/relationships" xmlns:p="http://schemas.openxmlformats.org/presentationml/2006/main">
   <p:cSld>
     <p:bg>
       <p:bgPr>
         <a:solidFill>
-          <a:srgbClr val="BA141A"/>
+          <a:srgbClr val="C00000"/>
         </a:solidFill>
         <a:effectLst/>
       </p:bgPr>
@@ -6300,6 +6708,436 @@
       </p:grpSpPr>
       <p:sp>
         <p:nvSpPr>
+          <p:cNvPr id="2" name="Title 1">
+            <a:extLst>
+              <a:ext uri="{FF2B5EF4-FFF2-40B4-BE49-F238E27FC236}">
+                <a16:creationId xmlns:a16="http://schemas.microsoft.com/office/drawing/2014/main" id="{D284052B-B473-4AE6-8D09-17C8D3B6A90C}"/>
+              </a:ext>
+            </a:extLst>
+          </p:cNvPr>
+          <p:cNvSpPr>
+            <a:spLocks noGrp="1"/>
+          </p:cNvSpPr>
+          <p:nvPr>
+            <p:ph type="title"/>
+          </p:nvPr>
+        </p:nvSpPr>
+        <p:spPr/>
+        <p:txBody>
+          <a:bodyPr/>
+          <a:lstStyle/>
+          <a:p>
+            <a:r>
+              <a:rPr lang="da-DK" dirty="0">
+                <a:solidFill>
+                  <a:schemeClr val="bg1"/>
+                </a:solidFill>
+              </a:rPr>
+              <a:t>ASP.NET Core SignalR server</a:t>
+            </a:r>
+            <a:endParaRPr lang="en-DK" dirty="0">
+              <a:solidFill>
+                <a:schemeClr val="bg1"/>
+              </a:solidFill>
+            </a:endParaRPr>
+          </a:p>
+        </p:txBody>
+      </p:sp>
+      <p:sp>
+        <p:nvSpPr>
+          <p:cNvPr id="3" name="Text Placeholder 2">
+            <a:extLst>
+              <a:ext uri="{FF2B5EF4-FFF2-40B4-BE49-F238E27FC236}">
+                <a16:creationId xmlns:a16="http://schemas.microsoft.com/office/drawing/2014/main" id="{FF9D950B-E311-48B3-8758-51C945BC0880}"/>
+              </a:ext>
+            </a:extLst>
+          </p:cNvPr>
+          <p:cNvSpPr>
+            <a:spLocks noGrp="1"/>
+          </p:cNvSpPr>
+          <p:nvPr>
+            <p:ph type="body" sz="quarter" idx="10"/>
+          </p:nvPr>
+        </p:nvSpPr>
+        <p:spPr>
+          <a:xfrm>
+            <a:off x="274209" y="1212850"/>
+            <a:ext cx="8778240" cy="5903154"/>
+          </a:xfrm>
+        </p:spPr>
+        <p:txBody>
+          <a:bodyPr/>
+          <a:lstStyle/>
+          <a:p>
+            <a:r>
+              <a:rPr lang="da-DK" dirty="0">
+                <a:solidFill>
+                  <a:schemeClr val="bg1"/>
+                </a:solidFill>
+              </a:rPr>
+              <a:t>Real time app using SignalR</a:t>
+            </a:r>
+          </a:p>
+          <a:p>
+            <a:pPr marL="571500" indent="-571500">
+              <a:buFont typeface="Symbol" panose="05050102010706020507" pitchFamily="18" charset="2"/>
+              <a:buChar char="Þ"/>
+            </a:pPr>
+            <a:r>
+              <a:rPr lang="da-DK" sz="2800" dirty="0">
+                <a:solidFill>
+                  <a:schemeClr val="bg1"/>
+                </a:solidFill>
+                <a:latin typeface="Consolas" panose="020B0609020204030204" pitchFamily="49" charset="0"/>
+              </a:rPr>
+              <a:t>services.AddSignalR();</a:t>
+            </a:r>
+          </a:p>
+          <a:p>
+            <a:pPr marL="571500" indent="-571500">
+              <a:buFont typeface="Symbol" panose="05050102010706020507" pitchFamily="18" charset="2"/>
+              <a:buChar char="Þ"/>
+            </a:pPr>
+            <a:r>
+              <a:rPr lang="da-DK" sz="2800" dirty="0">
+                <a:solidFill>
+                  <a:schemeClr val="bg1"/>
+                </a:solidFill>
+                <a:latin typeface="Consolas" panose="020B0609020204030204" pitchFamily="49" charset="0"/>
+              </a:rPr>
+              <a:t>app.UseSignalR(route =&gt; {    </a:t>
+            </a:r>
+          </a:p>
+          <a:p>
+            <a:r>
+              <a:rPr lang="da-DK" sz="2800" dirty="0">
+                <a:solidFill>
+                  <a:schemeClr val="bg1"/>
+                </a:solidFill>
+                <a:latin typeface="Consolas" panose="020B0609020204030204" pitchFamily="49" charset="0"/>
+              </a:rPr>
+              <a:t>       route.MapHub&lt;MyHub&gt;("/hub"); </a:t>
+            </a:r>
+          </a:p>
+          <a:p>
+            <a:r>
+              <a:rPr lang="da-DK" sz="2800" dirty="0">
+                <a:solidFill>
+                  <a:schemeClr val="bg1"/>
+                </a:solidFill>
+                <a:latin typeface="Consolas" panose="020B0609020204030204" pitchFamily="49" charset="0"/>
+              </a:rPr>
+              <a:t>   });</a:t>
+            </a:r>
+          </a:p>
+          <a:p>
+            <a:pPr marL="571500" indent="-571500">
+              <a:buFont typeface="Symbol" panose="05050102010706020507" pitchFamily="18" charset="2"/>
+              <a:buChar char="Þ"/>
+            </a:pPr>
+            <a:r>
+              <a:rPr lang="da-DK" dirty="0">
+                <a:solidFill>
+                  <a:schemeClr val="bg1"/>
+                </a:solidFill>
+                <a:hlinkClick r:id="rId2"/>
+              </a:rPr>
+              <a:t>https://docs.microsoft.com/en-us/aspnet/core/tutorials/signalr</a:t>
+            </a:r>
+            <a:r>
+              <a:rPr lang="da-DK" dirty="0">
+                <a:solidFill>
+                  <a:schemeClr val="bg1"/>
+                </a:solidFill>
+              </a:rPr>
+              <a:t> </a:t>
+            </a:r>
+          </a:p>
+          <a:p>
+            <a:pPr marL="571500" indent="-571500">
+              <a:buFont typeface="Symbol" panose="05050102010706020507" pitchFamily="18" charset="2"/>
+              <a:buChar char="Þ"/>
+            </a:pPr>
+            <a:r>
+              <a:rPr lang="da-DK" dirty="0">
+                <a:solidFill>
+                  <a:schemeClr val="bg1"/>
+                </a:solidFill>
+                <a:hlinkClick r:id="rId3"/>
+              </a:rPr>
+              <a:t>https://docs.microsoft.com/en-us/aspnet/core/signalr/hubs?view=aspnetcore-2.1</a:t>
+            </a:r>
+            <a:r>
+              <a:rPr lang="da-DK" dirty="0">
+                <a:solidFill>
+                  <a:schemeClr val="bg1"/>
+                </a:solidFill>
+              </a:rPr>
+              <a:t>  </a:t>
+            </a:r>
+          </a:p>
+          <a:p>
+            <a:endParaRPr lang="en-DK" dirty="0">
+              <a:solidFill>
+                <a:schemeClr val="bg1"/>
+              </a:solidFill>
+            </a:endParaRPr>
+          </a:p>
+        </p:txBody>
+      </p:sp>
+    </p:spTree>
+    <p:extLst>
+      <p:ext uri="{BB962C8B-B14F-4D97-AF65-F5344CB8AC3E}">
+        <p14:creationId xmlns:p14="http://schemas.microsoft.com/office/powerpoint/2010/main" val="220717903"/>
+      </p:ext>
+    </p:extLst>
+  </p:cSld>
+  <p:clrMapOvr>
+    <a:masterClrMapping/>
+  </p:clrMapOvr>
+  <p:transition>
+    <p:fade/>
+  </p:transition>
+</p:sld>
+</file>
+
+<file path=ppt/slides/slide8.xml><?xml version="1.0" encoding="utf-8"?>
+<p:sld xmlns:a="http://schemas.openxmlformats.org/drawingml/2006/main" xmlns:r="http://schemas.openxmlformats.org/officeDocument/2006/relationships" xmlns:p="http://schemas.openxmlformats.org/presentationml/2006/main">
+  <p:cSld>
+    <p:bg>
+      <p:bgPr>
+        <a:solidFill>
+          <a:srgbClr val="C00000"/>
+        </a:solidFill>
+        <a:effectLst/>
+      </p:bgPr>
+    </p:bg>
+    <p:spTree>
+      <p:nvGrpSpPr>
+        <p:cNvPr id="1" name=""/>
+        <p:cNvGrpSpPr/>
+        <p:nvPr/>
+      </p:nvGrpSpPr>
+      <p:grpSpPr>
+        <a:xfrm>
+          <a:off x="0" y="0"/>
+          <a:ext cx="0" cy="0"/>
+          <a:chOff x="0" y="0"/>
+          <a:chExt cx="0" cy="0"/>
+        </a:xfrm>
+      </p:grpSpPr>
+      <p:sp>
+        <p:nvSpPr>
+          <p:cNvPr id="2" name="Title 1">
+            <a:extLst>
+              <a:ext uri="{FF2B5EF4-FFF2-40B4-BE49-F238E27FC236}">
+                <a16:creationId xmlns:a16="http://schemas.microsoft.com/office/drawing/2014/main" id="{D284052B-B473-4AE6-8D09-17C8D3B6A90C}"/>
+              </a:ext>
+            </a:extLst>
+          </p:cNvPr>
+          <p:cNvSpPr>
+            <a:spLocks noGrp="1"/>
+          </p:cNvSpPr>
+          <p:nvPr>
+            <p:ph type="title"/>
+          </p:nvPr>
+        </p:nvSpPr>
+        <p:spPr/>
+        <p:txBody>
+          <a:bodyPr/>
+          <a:lstStyle/>
+          <a:p>
+            <a:r>
+              <a:rPr lang="da-DK" dirty="0">
+                <a:solidFill>
+                  <a:schemeClr val="bg1"/>
+                </a:solidFill>
+              </a:rPr>
+              <a:t>ASP.NET Core SignalR client</a:t>
+            </a:r>
+            <a:endParaRPr lang="en-DK" dirty="0">
+              <a:solidFill>
+                <a:schemeClr val="bg1"/>
+              </a:solidFill>
+            </a:endParaRPr>
+          </a:p>
+        </p:txBody>
+      </p:sp>
+      <p:sp>
+        <p:nvSpPr>
+          <p:cNvPr id="3" name="Text Placeholder 2">
+            <a:extLst>
+              <a:ext uri="{FF2B5EF4-FFF2-40B4-BE49-F238E27FC236}">
+                <a16:creationId xmlns:a16="http://schemas.microsoft.com/office/drawing/2014/main" id="{FF9D950B-E311-48B3-8758-51C945BC0880}"/>
+              </a:ext>
+            </a:extLst>
+          </p:cNvPr>
+          <p:cNvSpPr>
+            <a:spLocks noGrp="1"/>
+          </p:cNvSpPr>
+          <p:nvPr>
+            <p:ph type="body" sz="quarter" idx="10"/>
+          </p:nvPr>
+        </p:nvSpPr>
+        <p:spPr>
+          <a:xfrm>
+            <a:off x="274209" y="1212850"/>
+            <a:ext cx="8778240" cy="3927229"/>
+          </a:xfrm>
+        </p:spPr>
+        <p:txBody>
+          <a:bodyPr/>
+          <a:lstStyle/>
+          <a:p>
+            <a:pPr marL="571500" indent="-571500">
+              <a:buFont typeface="Symbol" panose="05050102010706020507" pitchFamily="18" charset="2"/>
+              <a:buChar char="Þ"/>
+            </a:pPr>
+            <a:r>
+              <a:rPr lang="da-DK" sz="3200" dirty="0">
+                <a:solidFill>
+                  <a:schemeClr val="bg1"/>
+                </a:solidFill>
+                <a:latin typeface="Consolas" panose="020B0609020204030204" pitchFamily="49" charset="0"/>
+              </a:rPr>
+              <a:t>PS&gt; Install-Package Microsoft.AspNetCore.SignalR.Client</a:t>
+            </a:r>
+          </a:p>
+          <a:p>
+            <a:pPr marL="571500" indent="-571500">
+              <a:buFont typeface="Symbol" panose="05050102010706020507" pitchFamily="18" charset="2"/>
+              <a:buChar char="Þ"/>
+            </a:pPr>
+            <a:r>
+              <a:rPr lang="da-DK" sz="3200" dirty="0">
+                <a:solidFill>
+                  <a:schemeClr val="bg1"/>
+                </a:solidFill>
+                <a:latin typeface="Consolas" panose="020B0609020204030204" pitchFamily="49" charset="0"/>
+              </a:rPr>
+              <a:t>PS&gt; Install-Package System.Threading.Tasks.Extensions</a:t>
+            </a:r>
+          </a:p>
+          <a:p>
+            <a:pPr marL="571500" indent="-571500">
+              <a:buFont typeface="Symbol" panose="05050102010706020507" pitchFamily="18" charset="2"/>
+              <a:buChar char="Þ"/>
+            </a:pPr>
+            <a:r>
+              <a:rPr lang="en-US" sz="3200" dirty="0">
+                <a:solidFill>
+                  <a:schemeClr val="bg1"/>
+                </a:solidFill>
+                <a:latin typeface="Consolas" panose="020B0609020204030204" pitchFamily="49" charset="0"/>
+              </a:rPr>
+              <a:t>connection = new </a:t>
+            </a:r>
+            <a:r>
+              <a:rPr lang="en-US" sz="3200" dirty="0" err="1">
+                <a:solidFill>
+                  <a:schemeClr val="bg1"/>
+                </a:solidFill>
+                <a:latin typeface="Consolas" panose="020B0609020204030204" pitchFamily="49" charset="0"/>
+              </a:rPr>
+              <a:t>HubConnectionBuilder</a:t>
+            </a:r>
+            <a:r>
+              <a:rPr lang="en-US" sz="3200" dirty="0">
+                <a:solidFill>
+                  <a:schemeClr val="bg1"/>
+                </a:solidFill>
+                <a:latin typeface="Consolas" panose="020B0609020204030204" pitchFamily="49" charset="0"/>
+              </a:rPr>
+              <a:t>() .</a:t>
+            </a:r>
+            <a:r>
+              <a:rPr lang="en-US" sz="3200" dirty="0" err="1">
+                <a:solidFill>
+                  <a:schemeClr val="bg1"/>
+                </a:solidFill>
+                <a:latin typeface="Consolas" panose="020B0609020204030204" pitchFamily="49" charset="0"/>
+              </a:rPr>
+              <a:t>WithUrl</a:t>
+            </a:r>
+            <a:r>
+              <a:rPr lang="en-US" sz="3200" dirty="0">
+                <a:solidFill>
+                  <a:schemeClr val="bg1"/>
+                </a:solidFill>
+                <a:latin typeface="Consolas" panose="020B0609020204030204" pitchFamily="49" charset="0"/>
+              </a:rPr>
+              <a:t>("http://localhost:53353/</a:t>
+            </a:r>
+            <a:r>
+              <a:rPr lang="en-US" sz="3200" dirty="0" err="1">
+                <a:solidFill>
+                  <a:schemeClr val="bg1"/>
+                </a:solidFill>
+                <a:latin typeface="Consolas" panose="020B0609020204030204" pitchFamily="49" charset="0"/>
+              </a:rPr>
+              <a:t>ChatHub</a:t>
+            </a:r>
+            <a:r>
+              <a:rPr lang="en-US" sz="3200" dirty="0">
+                <a:solidFill>
+                  <a:schemeClr val="bg1"/>
+                </a:solidFill>
+                <a:latin typeface="Consolas" panose="020B0609020204030204" pitchFamily="49" charset="0"/>
+              </a:rPr>
+              <a:t>") .Build();</a:t>
+            </a:r>
+            <a:endParaRPr lang="da-DK" sz="3200" dirty="0">
+              <a:solidFill>
+                <a:schemeClr val="bg1"/>
+              </a:solidFill>
+              <a:latin typeface="Consolas" panose="020B0609020204030204" pitchFamily="49" charset="0"/>
+            </a:endParaRPr>
+          </a:p>
+        </p:txBody>
+      </p:sp>
+    </p:spTree>
+    <p:extLst>
+      <p:ext uri="{BB962C8B-B14F-4D97-AF65-F5344CB8AC3E}">
+        <p14:creationId xmlns:p14="http://schemas.microsoft.com/office/powerpoint/2010/main" val="428544697"/>
+      </p:ext>
+    </p:extLst>
+  </p:cSld>
+  <p:clrMapOvr>
+    <a:masterClrMapping/>
+  </p:clrMapOvr>
+  <p:transition>
+    <p:fade/>
+  </p:transition>
+</p:sld>
+</file>
+
+<file path=ppt/slides/slide9.xml><?xml version="1.0" encoding="utf-8"?>
+<p:sld xmlns:a="http://schemas.openxmlformats.org/drawingml/2006/main" xmlns:r="http://schemas.openxmlformats.org/officeDocument/2006/relationships" xmlns:p="http://schemas.openxmlformats.org/presentationml/2006/main">
+  <p:cSld>
+    <p:bg>
+      <p:bgPr>
+        <a:solidFill>
+          <a:srgbClr val="007233"/>
+        </a:solidFill>
+        <a:effectLst/>
+      </p:bgPr>
+    </p:bg>
+    <p:spTree>
+      <p:nvGrpSpPr>
+        <p:cNvPr id="1" name=""/>
+        <p:cNvGrpSpPr/>
+        <p:nvPr/>
+      </p:nvGrpSpPr>
+      <p:grpSpPr>
+        <a:xfrm>
+          <a:off x="0" y="0"/>
+          <a:ext cx="0" cy="0"/>
+          <a:chOff x="0" y="0"/>
+          <a:chExt cx="0" cy="0"/>
+        </a:xfrm>
+      </p:grpSpPr>
+      <p:sp>
+        <p:nvSpPr>
           <p:cNvPr id="2" name="Title 1"/>
           <p:cNvSpPr>
             <a:spLocks noGrp="1"/>
@@ -6329,36 +7167,46 @@
               </a:rPr>
               <a:t>Lecture</a:t>
             </a:r>
+            <a:endParaRPr lang="da-DK" dirty="0"/>
+          </a:p>
+        </p:txBody>
+      </p:sp>
+      <p:sp>
+        <p:nvSpPr>
+          <p:cNvPr id="3" name="Text Placeholder 2"/>
+          <p:cNvSpPr>
+            <a:spLocks noGrp="1"/>
+          </p:cNvSpPr>
+          <p:nvPr>
+            <p:ph type="body" sz="quarter" idx="10"/>
+          </p:nvPr>
+        </p:nvSpPr>
+        <p:spPr>
+          <a:xfrm>
+            <a:off x="274209" y="1212850"/>
+            <a:ext cx="8778240" cy="1902059"/>
+          </a:xfrm>
+        </p:spPr>
+        <p:txBody>
+          <a:bodyPr/>
+          <a:lstStyle/>
+          <a:p>
             <a:r>
               <a:rPr lang="da-DK" dirty="0">
                 <a:solidFill>
                   <a:schemeClr val="bg1"/>
                 </a:solidFill>
               </a:rPr>
-              <a:t> II</a:t>
-            </a:r>
-          </a:p>
-        </p:txBody>
-      </p:sp>
-      <p:sp>
-        <p:nvSpPr>
-          <p:cNvPr id="3" name="Text Placeholder 2"/>
-          <p:cNvSpPr>
-            <a:spLocks noGrp="1"/>
-          </p:cNvSpPr>
-          <p:nvPr>
-            <p:ph type="body" sz="quarter" idx="10"/>
-          </p:nvPr>
-        </p:nvSpPr>
-        <p:spPr>
-          <a:xfrm>
-            <a:off x="274209" y="1212850"/>
-            <a:ext cx="8778240" cy="4949047"/>
-          </a:xfrm>
-        </p:spPr>
-        <p:txBody>
-          <a:bodyPr/>
-          <a:lstStyle/>
+              <a:t>16 November 2018</a:t>
+            </a:r>
+          </a:p>
+          <a:p>
+            <a:endParaRPr lang="da-DK" dirty="0">
+              <a:solidFill>
+                <a:schemeClr val="bg1"/>
+              </a:solidFill>
+            </a:endParaRPr>
+          </a:p>
           <a:p>
             <a:r>
               <a:rPr lang="da-DK" dirty="0" err="1">
@@ -6366,7 +7214,7 @@
                   <a:schemeClr val="bg1"/>
                 </a:solidFill>
               </a:rPr>
-              <a:t>Topics</a:t>
+              <a:t>Recap</a:t>
             </a:r>
             <a:r>
               <a:rPr lang="da-DK" dirty="0">
@@ -6374,137 +7222,7 @@
                   <a:schemeClr val="bg1"/>
                 </a:solidFill>
               </a:rPr>
-              <a:t>:</a:t>
-            </a:r>
-          </a:p>
-          <a:p>
-            <a:r>
-              <a:rPr lang="da-DK" dirty="0">
-                <a:solidFill>
-                  <a:schemeClr val="bg1"/>
-                </a:solidFill>
-              </a:rPr>
-              <a:t>Publishing apps to the cloud</a:t>
-            </a:r>
-          </a:p>
-          <a:p>
-            <a:r>
-              <a:rPr lang="da-DK" dirty="0" err="1">
-                <a:solidFill>
-                  <a:schemeClr val="bg1"/>
-                </a:solidFill>
-              </a:rPr>
-              <a:t>Exception</a:t>
-            </a:r>
-            <a:r>
-              <a:rPr lang="da-DK" dirty="0">
-                <a:solidFill>
-                  <a:schemeClr val="bg1"/>
-                </a:solidFill>
-              </a:rPr>
-              <a:t> handling</a:t>
-            </a:r>
-          </a:p>
-          <a:p>
-            <a:r>
-              <a:rPr lang="da-DK" dirty="0" err="1">
-                <a:solidFill>
-                  <a:schemeClr val="bg1"/>
-                </a:solidFill>
-              </a:rPr>
-              <a:t>IDisposable</a:t>
-            </a:r>
-            <a:endParaRPr lang="da-DK" dirty="0">
-              <a:solidFill>
-                <a:schemeClr val="bg1"/>
-              </a:solidFill>
-            </a:endParaRPr>
-          </a:p>
-          <a:p>
-            <a:r>
-              <a:rPr lang="da-DK" dirty="0" err="1">
-                <a:solidFill>
-                  <a:schemeClr val="bg1"/>
-                </a:solidFill>
-              </a:rPr>
-              <a:t>Settings</a:t>
-            </a:r>
-            <a:r>
-              <a:rPr lang="da-DK" dirty="0">
-                <a:solidFill>
-                  <a:schemeClr val="bg1"/>
-                </a:solidFill>
-              </a:rPr>
-              <a:t> and </a:t>
-            </a:r>
-            <a:r>
-              <a:rPr lang="da-DK" dirty="0" err="1">
-                <a:solidFill>
-                  <a:schemeClr val="bg1"/>
-                </a:solidFill>
-              </a:rPr>
-              <a:t>secrets</a:t>
-            </a:r>
-            <a:endParaRPr lang="da-DK" dirty="0">
-              <a:solidFill>
-                <a:schemeClr val="bg1"/>
-              </a:solidFill>
-            </a:endParaRPr>
-          </a:p>
-          <a:p>
-            <a:r>
-              <a:rPr lang="da-DK" dirty="0" err="1">
-                <a:solidFill>
-                  <a:schemeClr val="bg1"/>
-                </a:solidFill>
-              </a:rPr>
-              <a:t>Logging</a:t>
-            </a:r>
-            <a:endParaRPr lang="da-DK" dirty="0">
-              <a:solidFill>
-                <a:schemeClr val="bg1"/>
-              </a:solidFill>
-            </a:endParaRPr>
-          </a:p>
-          <a:p>
-            <a:r>
-              <a:rPr lang="da-DK" dirty="0">
-                <a:solidFill>
-                  <a:schemeClr val="bg1"/>
-                </a:solidFill>
-              </a:rPr>
-              <a:t>Security in UWP and </a:t>
-            </a:r>
-            <a:r>
-              <a:rPr lang="da-DK" dirty="0" err="1">
-                <a:solidFill>
-                  <a:schemeClr val="bg1"/>
-                </a:solidFill>
-              </a:rPr>
-              <a:t>Xamarin.Forms</a:t>
-            </a:r>
-            <a:endParaRPr lang="da-DK" dirty="0">
-              <a:solidFill>
-                <a:schemeClr val="bg1"/>
-              </a:solidFill>
-            </a:endParaRPr>
-          </a:p>
-          <a:p>
-            <a:r>
-              <a:rPr lang="da-DK" dirty="0" err="1">
-                <a:solidFill>
-                  <a:schemeClr val="bg1"/>
-                </a:solidFill>
-              </a:rPr>
-              <a:t>Entity</a:t>
-            </a:r>
-            <a:r>
-              <a:rPr lang="da-DK" dirty="0">
-                <a:solidFill>
-                  <a:schemeClr val="bg1"/>
-                </a:solidFill>
-              </a:rPr>
-              <a:t> Framework Core – </a:t>
+              <a:t> / repetition – </a:t>
             </a:r>
             <a:r>
               <a:rPr lang="da-DK" dirty="0" err="1">
@@ -6520,6 +7238,38 @@
                   <a:schemeClr val="bg1"/>
                 </a:solidFill>
               </a:rPr>
+              <a:t> do </a:t>
+            </a:r>
+            <a:r>
+              <a:rPr lang="da-DK" dirty="0" err="1">
+                <a:solidFill>
+                  <a:schemeClr val="bg1"/>
+                </a:solidFill>
+              </a:rPr>
+              <a:t>you</a:t>
+            </a:r>
+            <a:r>
+              <a:rPr lang="da-DK" dirty="0">
+                <a:solidFill>
+                  <a:schemeClr val="bg1"/>
+                </a:solidFill>
+              </a:rPr>
+              <a:t> </a:t>
+            </a:r>
+            <a:r>
+              <a:rPr lang="da-DK" dirty="0" err="1">
+                <a:solidFill>
+                  <a:schemeClr val="bg1"/>
+                </a:solidFill>
+              </a:rPr>
+              <a:t>need</a:t>
+            </a:r>
+            <a:r>
+              <a:rPr lang="da-DK" dirty="0">
+                <a:solidFill>
+                  <a:schemeClr val="bg1"/>
+                </a:solidFill>
+              </a:rPr>
               <a:t>?</a:t>
             </a:r>
           </a:p>
@@ -6528,7 +7278,7 @@
     </p:spTree>
     <p:extLst>
       <p:ext uri="{BB962C8B-B14F-4D97-AF65-F5344CB8AC3E}">
-        <p14:creationId xmlns:p14="http://schemas.microsoft.com/office/powerpoint/2010/main" val="3512292764"/>
+        <p14:creationId xmlns:p14="http://schemas.microsoft.com/office/powerpoint/2010/main" val="3493958456"/>
       </p:ext>
     </p:extLst>
   </p:cSld>
@@ -7402,6 +8152,61 @@
 </file>
 
 <file path=customXml/item1.xml><?xml version="1.0" encoding="utf-8"?>
+<p:properties xmlns:p="http://schemas.microsoft.com/office/2006/metadata/properties" xmlns:xsi="http://www.w3.org/2001/XMLSchema-instance" xmlns:pc="http://schemas.microsoft.com/office/infopath/2007/PartnerControls">
+  <documentManagement>
+    <TrackTaxHTField0 xmlns="2295e2e7-0eeb-498e-8716-217bb2ee6ee3">
+      <Terms xmlns="http://schemas.microsoft.com/office/infopath/2007/PartnerControls"/>
+    </TrackTaxHTField0>
+    <CampaignTaxHTField0 xmlns="2295e2e7-0eeb-498e-8716-217bb2ee6ee3">
+      <Terms xmlns="http://schemas.microsoft.com/office/infopath/2007/PartnerControls"/>
+    </CampaignTaxHTField0>
+    <Event_x0020_End_x0020_Date xmlns="2295e2e7-0eeb-498e-8716-217bb2ee6ee3" xsi:nil="true"/>
+    <Event_x0020_Start_x0020_Date xmlns="2295e2e7-0eeb-498e-8716-217bb2ee6ee3" xsi:nil="true"/>
+    <MS_x0020_Speaker xmlns="2295e2e7-0eeb-498e-8716-217bb2ee6ee3">
+      <UserInfo>
+        <DisplayName/>
+        <AccountId xsi:nil="true"/>
+        <AccountType/>
+      </UserInfo>
+    </MS_x0020_Speaker>
+    <External_x0020_Speaker xmlns="2295e2e7-0eeb-498e-8716-217bb2ee6ee3" xsi:nil="true"/>
+    <Session_x0020_Code xmlns="2295e2e7-0eeb-498e-8716-217bb2ee6ee3" xsi:nil="true"/>
+    <ProductTaxHTField0 xmlns="2295e2e7-0eeb-498e-8716-217bb2ee6ee3">
+      <Terms xmlns="http://schemas.microsoft.com/office/infopath/2007/PartnerControls"/>
+    </ProductTaxHTField0>
+    <Presentation_x0020_Date xmlns="2295e2e7-0eeb-498e-8716-217bb2ee6ee3" xsi:nil="true"/>
+    <Event_x0020_LocationTaxHTField0 xmlns="2295e2e7-0eeb-498e-8716-217bb2ee6ee3">
+      <Terms xmlns="http://schemas.microsoft.com/office/infopath/2007/PartnerControls"/>
+    </Event_x0020_LocationTaxHTField0>
+    <Event1TaxHTField0 xmlns="2295e2e7-0eeb-498e-8716-217bb2ee6ee3">
+      <Terms xmlns="http://schemas.microsoft.com/office/infopath/2007/PartnerControls">
+        <TermInfo xmlns="http://schemas.microsoft.com/office/infopath/2007/PartnerControls">
+          <TermName xmlns="http://schemas.microsoft.com/office/infopath/2007/PartnerControls">Unassigned</TermName>
+          <TermId xmlns="http://schemas.microsoft.com/office/infopath/2007/PartnerControls">e51362f4-782c-41a8-bb7b-e0cfc8669933</TermId>
+        </TermInfo>
+      </Terms>
+    </Event1TaxHTField0>
+    <AudienceTaxHTField0 xmlns="8b529f77-48ab-4581-b468-93f09345b8aa">
+      <Terms xmlns="http://schemas.microsoft.com/office/infopath/2007/PartnerControls"/>
+    </AudienceTaxHTField0>
+    <MS_x0020_Content_x0020_Owner xmlns="2295e2e7-0eeb-498e-8716-217bb2ee6ee3">
+      <UserInfo>
+        <DisplayName/>
+        <AccountId xsi:nil="true"/>
+        <AccountType/>
+      </UserInfo>
+    </MS_x0020_Content_x0020_Owner>
+    <TaxCatchAll xmlns="2295e2e7-0eeb-498e-8716-217bb2ee6ee3">
+      <Value>217</Value>
+    </TaxCatchAll>
+    <Event_x0020_VenueTaxHTField0 xmlns="2295e2e7-0eeb-498e-8716-217bb2ee6ee3">
+      <Terms xmlns="http://schemas.microsoft.com/office/infopath/2007/PartnerControls"/>
+    </Event_x0020_VenueTaxHTField0>
+  </documentManagement>
+</p:properties>
+</file>
+
+<file path=customXml/item2.xml><?xml version="1.0" encoding="utf-8"?>
 <ct:contentTypeSchema xmlns:ct="http://schemas.microsoft.com/office/2006/metadata/contentType" xmlns:ma="http://schemas.microsoft.com/office/2006/metadata/properties/metaAttributes" ct:_="" ma:_="" ma:contentTypeName="PresentationsDoc" ma:contentTypeID="0x010100B88FC3ECA26D1C46B3C4C83281D2EB9C003BBE479AF4108146A616B6B5E7069DBC" ma:contentTypeVersion="61" ma:contentTypeDescription="" ma:contentTypeScope="" ma:versionID="72533711bacf991a4680f48ae6b725f9">
   <xsd:schema xmlns:xsd="http://www.w3.org/2001/XMLSchema" xmlns:xs="http://www.w3.org/2001/XMLSchema" xmlns:p="http://schemas.microsoft.com/office/2006/metadata/properties" xmlns:ns2="2295e2e7-0eeb-498e-8716-217bb2ee6ee3" xmlns:ns3="8b529f77-48ab-4581-b468-93f09345b8aa" targetNamespace="http://schemas.microsoft.com/office/2006/metadata/properties" ma:root="true" ma:fieldsID="dde17010d50e6e632f300eac8dfd378e" ns2:_="" ns3:_="">
     <xsd:import namespace="2295e2e7-0eeb-498e-8716-217bb2ee6ee3"/>
@@ -7680,7 +8485,7 @@
 </ct:contentTypeSchema>
 </file>
 
-<file path=customXml/item2.xml><?xml version="1.0" encoding="utf-8"?>
+<file path=customXml/item3.xml><?xml version="1.0" encoding="utf-8"?>
 <?mso-contentType ?>
 <FormTemplates xmlns="http://schemas.microsoft.com/sharepoint/v3/contenttype/forms">
   <Display>DocumentLibraryForm</Display>
@@ -7689,62 +8494,24 @@
 </FormTemplates>
 </file>
 
-<file path=customXml/item3.xml><?xml version="1.0" encoding="utf-8"?>
-<p:properties xmlns:p="http://schemas.microsoft.com/office/2006/metadata/properties" xmlns:xsi="http://www.w3.org/2001/XMLSchema-instance" xmlns:pc="http://schemas.microsoft.com/office/infopath/2007/PartnerControls">
-  <documentManagement>
-    <TrackTaxHTField0 xmlns="2295e2e7-0eeb-498e-8716-217bb2ee6ee3">
-      <Terms xmlns="http://schemas.microsoft.com/office/infopath/2007/PartnerControls"/>
-    </TrackTaxHTField0>
-    <CampaignTaxHTField0 xmlns="2295e2e7-0eeb-498e-8716-217bb2ee6ee3">
-      <Terms xmlns="http://schemas.microsoft.com/office/infopath/2007/PartnerControls"/>
-    </CampaignTaxHTField0>
-    <Event_x0020_End_x0020_Date xmlns="2295e2e7-0eeb-498e-8716-217bb2ee6ee3" xsi:nil="true"/>
-    <Event_x0020_Start_x0020_Date xmlns="2295e2e7-0eeb-498e-8716-217bb2ee6ee3" xsi:nil="true"/>
-    <MS_x0020_Speaker xmlns="2295e2e7-0eeb-498e-8716-217bb2ee6ee3">
-      <UserInfo>
-        <DisplayName/>
-        <AccountId xsi:nil="true"/>
-        <AccountType/>
-      </UserInfo>
-    </MS_x0020_Speaker>
-    <External_x0020_Speaker xmlns="2295e2e7-0eeb-498e-8716-217bb2ee6ee3" xsi:nil="true"/>
-    <Session_x0020_Code xmlns="2295e2e7-0eeb-498e-8716-217bb2ee6ee3" xsi:nil="true"/>
-    <ProductTaxHTField0 xmlns="2295e2e7-0eeb-498e-8716-217bb2ee6ee3">
-      <Terms xmlns="http://schemas.microsoft.com/office/infopath/2007/PartnerControls"/>
-    </ProductTaxHTField0>
-    <Presentation_x0020_Date xmlns="2295e2e7-0eeb-498e-8716-217bb2ee6ee3" xsi:nil="true"/>
-    <Event_x0020_LocationTaxHTField0 xmlns="2295e2e7-0eeb-498e-8716-217bb2ee6ee3">
-      <Terms xmlns="http://schemas.microsoft.com/office/infopath/2007/PartnerControls"/>
-    </Event_x0020_LocationTaxHTField0>
-    <Event1TaxHTField0 xmlns="2295e2e7-0eeb-498e-8716-217bb2ee6ee3">
-      <Terms xmlns="http://schemas.microsoft.com/office/infopath/2007/PartnerControls">
-        <TermInfo xmlns="http://schemas.microsoft.com/office/infopath/2007/PartnerControls">
-          <TermName xmlns="http://schemas.microsoft.com/office/infopath/2007/PartnerControls">Unassigned</TermName>
-          <TermId xmlns="http://schemas.microsoft.com/office/infopath/2007/PartnerControls">e51362f4-782c-41a8-bb7b-e0cfc8669933</TermId>
-        </TermInfo>
-      </Terms>
-    </Event1TaxHTField0>
-    <AudienceTaxHTField0 xmlns="8b529f77-48ab-4581-b468-93f09345b8aa">
-      <Terms xmlns="http://schemas.microsoft.com/office/infopath/2007/PartnerControls"/>
-    </AudienceTaxHTField0>
-    <MS_x0020_Content_x0020_Owner xmlns="2295e2e7-0eeb-498e-8716-217bb2ee6ee3">
-      <UserInfo>
-        <DisplayName/>
-        <AccountId xsi:nil="true"/>
-        <AccountType/>
-      </UserInfo>
-    </MS_x0020_Content_x0020_Owner>
-    <TaxCatchAll xmlns="2295e2e7-0eeb-498e-8716-217bb2ee6ee3">
-      <Value>217</Value>
-    </TaxCatchAll>
-    <Event_x0020_VenueTaxHTField0 xmlns="2295e2e7-0eeb-498e-8716-217bb2ee6ee3">
-      <Terms xmlns="http://schemas.microsoft.com/office/infopath/2007/PartnerControls"/>
-    </Event_x0020_VenueTaxHTField0>
-  </documentManagement>
-</p:properties>
+<file path=customXml/itemProps1.xml><?xml version="1.0" encoding="utf-8"?>
+<ds:datastoreItem xmlns:ds="http://schemas.openxmlformats.org/officeDocument/2006/customXml" ds:itemID="{F990F116-B58F-4255-B05B-DA3808E0E5C6}">
+  <ds:schemaRefs>
+    <ds:schemaRef ds:uri="2295e2e7-0eeb-498e-8716-217bb2ee6ee3"/>
+    <ds:schemaRef ds:uri="http://purl.org/dc/terms/"/>
+    <ds:schemaRef ds:uri="http://schemas.microsoft.com/office/2006/documentManagement/types"/>
+    <ds:schemaRef ds:uri="http://schemas.microsoft.com/office/infopath/2007/PartnerControls"/>
+    <ds:schemaRef ds:uri="http://purl.org/dc/elements/1.1/"/>
+    <ds:schemaRef ds:uri="http://schemas.microsoft.com/office/2006/metadata/properties"/>
+    <ds:schemaRef ds:uri="8b529f77-48ab-4581-b468-93f09345b8aa"/>
+    <ds:schemaRef ds:uri="http://schemas.openxmlformats.org/package/2006/metadata/core-properties"/>
+    <ds:schemaRef ds:uri="http://www.w3.org/XML/1998/namespace"/>
+    <ds:schemaRef ds:uri="http://purl.org/dc/dcmitype/"/>
+  </ds:schemaRefs>
+</ds:datastoreItem>
 </file>
 
-<file path=customXml/itemProps1.xml><?xml version="1.0" encoding="utf-8"?>
+<file path=customXml/itemProps2.xml><?xml version="1.0" encoding="utf-8"?>
 <ds:datastoreItem xmlns:ds="http://schemas.openxmlformats.org/officeDocument/2006/customXml" ds:itemID="{A4A71FB1-3FB8-468F-9C64-2246CB74C7D9}">
   <ds:schemaRefs>
     <ds:schemaRef ds:uri="http://schemas.microsoft.com/office/2006/metadata/contentType"/>
@@ -7763,27 +8530,10 @@
 </ds:datastoreItem>
 </file>
 
-<file path=customXml/itemProps2.xml><?xml version="1.0" encoding="utf-8"?>
+<file path=customXml/itemProps3.xml><?xml version="1.0" encoding="utf-8"?>
 <ds:datastoreItem xmlns:ds="http://schemas.openxmlformats.org/officeDocument/2006/customXml" ds:itemID="{758FDAC0-319D-4A54-8D8E-1D42CB1F8004}">
   <ds:schemaRefs>
     <ds:schemaRef ds:uri="http://schemas.microsoft.com/sharepoint/v3/contenttype/forms"/>
   </ds:schemaRefs>
 </ds:datastoreItem>
-</file>
-
-<file path=customXml/itemProps3.xml><?xml version="1.0" encoding="utf-8"?>
-<ds:datastoreItem xmlns:ds="http://schemas.openxmlformats.org/officeDocument/2006/customXml" ds:itemID="{F990F116-B58F-4255-B05B-DA3808E0E5C6}">
-  <ds:schemaRefs>
-    <ds:schemaRef ds:uri="2295e2e7-0eeb-498e-8716-217bb2ee6ee3"/>
-    <ds:schemaRef ds:uri="http://purl.org/dc/terms/"/>
-    <ds:schemaRef ds:uri="http://schemas.microsoft.com/office/2006/documentManagement/types"/>
-    <ds:schemaRef ds:uri="http://schemas.microsoft.com/office/infopath/2007/PartnerControls"/>
-    <ds:schemaRef ds:uri="http://purl.org/dc/elements/1.1/"/>
-    <ds:schemaRef ds:uri="http://schemas.microsoft.com/office/2006/metadata/properties"/>
-    <ds:schemaRef ds:uri="8b529f77-48ab-4581-b468-93f09345b8aa"/>
-    <ds:schemaRef ds:uri="http://schemas.openxmlformats.org/package/2006/metadata/core-properties"/>
-    <ds:schemaRef ds:uri="http://www.w3.org/XML/1998/namespace"/>
-    <ds:schemaRef ds:uri="http://purl.org/dc/dcmitype/"/>
-  </ds:schemaRefs>
-</ds:datastoreItem>
 </file>
</xml_diff>